<commit_message>
Changes I did last week (...)
</commit_message>
<xml_diff>
--- a/test.pptx
+++ b/test.pptx
@@ -6,11 +6,8 @@
   </p:sldMasterIdLst>
   <p:sldIdLst>
     <p:sldId id="1144" r:id="rId5"/>
-    <p:sldId id="1145" r:id="rId6"/>
     <p:sldId id="1159" r:id="rId7"/>
-    <p:sldId id="1155" r:id="rId8"/>
     <p:sldId id="1160" r:id="rId14"/>
-    <p:sldId id="1161" r:id="rId15"/>
     <p:sldId id="1162" r:id="rId16"/>
     <p:sldId id="1163" r:id="rId17"/>
   </p:sldIdLst>
@@ -5855,63 +5852,6 @@
 </p:sld>
 </file>
 
-<file path=ppt/slides/slide2.xml><?xml version="1.0" encoding="utf-8"?>
-<p:sld xmlns:a="http://schemas.openxmlformats.org/drawingml/2006/main" xmlns:r="http://schemas.openxmlformats.org/officeDocument/2006/relationships" xmlns:p="http://schemas.openxmlformats.org/presentationml/2006/main">
-  <p:cSld>
-    <p:spTree>
-      <p:nvGrpSpPr>
-        <p:cNvPr id="1" name=""/>
-        <p:cNvGrpSpPr/>
-        <p:nvPr/>
-      </p:nvGrpSpPr>
-      <p:grpSpPr>
-        <a:xfrm>
-          <a:off x="0" y="0"/>
-          <a:ext cx="0" cy="0"/>
-          <a:chOff x="0" y="0"/>
-          <a:chExt cx="0" cy="0"/>
-        </a:xfrm>
-      </p:grpSpPr>
-      <p:sp>
-        <p:nvSpPr>
-          <p:cNvPr id="2" name="Title 1">
-            <a:extLst>
-              <a:ext uri="{FF2B5EF4-FFF2-40B4-BE49-F238E27FC236}">
-                <a16:creationId xmlns:a16="http://schemas.microsoft.com/office/drawing/2014/main" id="{F49F09D9-EBBF-0749-92D9-33C694CE5DE8}"/>
-              </a:ext>
-            </a:extLst>
-          </p:cNvPr>
-          <p:cNvSpPr>
-            <a:spLocks noGrp="1"/>
-          </p:cNvSpPr>
-          <p:nvPr>
-            <p:ph type="ctrTitle"/>
-          </p:nvPr>
-        </p:nvSpPr>
-        <p:spPr/>
-        <p:txBody>
-          <a:bodyPr>
-            <a:normAutofit fontScale="90000"/>
-          </a:bodyPr>
-          <a:lstStyle/>
-          <a:p>
-            <a:endParaRPr lang="en-US"/>
-          </a:p>
-        </p:txBody>
-      </p:sp>
-    </p:spTree>
-    <p:extLst>
-      <p:ext uri="{BB962C8B-B14F-4D97-AF65-F5344CB8AC3E}">
-        <p14:creationId xmlns:p14="http://schemas.microsoft.com/office/powerpoint/2010/main" val="113704594"/>
-      </p:ext>
-    </p:extLst>
-  </p:cSld>
-  <p:clrMapOvr>
-    <a:masterClrMapping/>
-  </p:clrMapOvr>
-</p:sld>
-</file>
-
 <file path=ppt/slides/slide3.xml><?xml version="1.0" encoding="utf-8"?>
 <p:sld xmlns:a="http://schemas.openxmlformats.org/drawingml/2006/main" xmlns:r="http://schemas.openxmlformats.org/officeDocument/2006/relationships" xmlns:p="http://schemas.openxmlformats.org/presentationml/2006/main">
   <p:cSld>
@@ -6184,198 +6124,6 @@
     <p:extLst>
       <p:ext uri="{BB962C8B-B14F-4D97-AF65-F5344CB8AC3E}">
         <p14:creationId xmlns:p14="http://schemas.microsoft.com/office/powerpoint/2010/main" val="369591808"/>
-      </p:ext>
-    </p:extLst>
-  </p:cSld>
-  <p:clrMapOvr>
-    <a:masterClrMapping/>
-  </p:clrMapOvr>
-  <mc:AlternateContent xmlns:mc="http://schemas.openxmlformats.org/markup-compatibility/2006" xmlns:p14="http://schemas.microsoft.com/office/powerpoint/2010/main">
-    <mc:Choice Requires="p14">
-      <p:transition spd="med" p14:dur="700">
-        <p:fade/>
-      </p:transition>
-    </mc:Choice>
-    <mc:Fallback xmlns="">
-      <p:transition spd="med">
-        <p:fade/>
-      </p:transition>
-    </mc:Fallback>
-  </mc:AlternateContent>
-</p:sld>
-</file>
-
-<file path=ppt/slides/slide4.xml><?xml version="1.0" encoding="utf-8"?>
-<p:sld xmlns:a="http://schemas.openxmlformats.org/drawingml/2006/main" xmlns:r="http://schemas.openxmlformats.org/officeDocument/2006/relationships" xmlns:p="http://schemas.openxmlformats.org/presentationml/2006/main">
-  <p:cSld>
-    <p:spTree>
-      <p:nvGrpSpPr>
-        <p:cNvPr id="1" name=""/>
-        <p:cNvGrpSpPr/>
-        <p:nvPr/>
-      </p:nvGrpSpPr>
-      <p:grpSpPr>
-        <a:xfrm>
-          <a:off x="0" y="0"/>
-          <a:ext cx="0" cy="0"/>
-          <a:chOff x="0" y="0"/>
-          <a:chExt cx="0" cy="0"/>
-        </a:xfrm>
-      </p:grpSpPr>
-      <p:sp>
-        <p:nvSpPr>
-          <p:cNvPr id="2" name="Title 1">
-            <a:extLst>
-              <a:ext uri="{FF2B5EF4-FFF2-40B4-BE49-F238E27FC236}">
-                <a16:creationId xmlns:a16="http://schemas.microsoft.com/office/drawing/2014/main" id="{D5B6FD9E-B8D7-4B04-AED1-5845618268D4}"/>
-              </a:ext>
-            </a:extLst>
-          </p:cNvPr>
-          <p:cNvSpPr>
-            <a:spLocks noGrp="1"/>
-          </p:cNvSpPr>
-          <p:nvPr>
-            <p:ph type="title"/>
-          </p:nvPr>
-        </p:nvSpPr>
-        <p:spPr/>
-        <p:txBody>
-          <a:bodyPr>
-            <a:normAutofit fontScale="90000"/>
-          </a:bodyPr>
-          <a:lstStyle/>
-          <a:p>
-            <a:endParaRPr lang="en-AU" dirty="0"/>
-          </a:p>
-        </p:txBody>
-      </p:sp>
-      <p:sp>
-        <p:nvSpPr>
-          <p:cNvPr id="5" name="Text Placeholder 4">
-            <a:extLst>
-              <a:ext uri="{FF2B5EF4-FFF2-40B4-BE49-F238E27FC236}">
-                <a16:creationId xmlns:a16="http://schemas.microsoft.com/office/drawing/2014/main" id="{9CBFC556-399C-4A96-B514-D1661552130A}"/>
-              </a:ext>
-            </a:extLst>
-          </p:cNvPr>
-          <p:cNvSpPr>
-            <a:spLocks noGrp="1"/>
-          </p:cNvSpPr>
-          <p:nvPr>
-            <p:ph type="body" sz="quarter" idx="19"/>
-          </p:nvPr>
-        </p:nvSpPr>
-        <p:spPr/>
-        <p:txBody>
-          <a:bodyPr/>
-          <a:lstStyle/>
-          <a:p>
-            <a:endParaRPr lang="en-AU"/>
-          </a:p>
-        </p:txBody>
-      </p:sp>
-      <p:sp>
-        <p:nvSpPr>
-          <p:cNvPr id="6" name="Text Placeholder 5">
-            <a:extLst>
-              <a:ext uri="{FF2B5EF4-FFF2-40B4-BE49-F238E27FC236}">
-                <a16:creationId xmlns:a16="http://schemas.microsoft.com/office/drawing/2014/main" id="{996990C7-FE93-4641-B2D4-7FFF3896FA98}"/>
-              </a:ext>
-            </a:extLst>
-          </p:cNvPr>
-          <p:cNvSpPr>
-            <a:spLocks noGrp="1"/>
-          </p:cNvSpPr>
-          <p:nvPr>
-            <p:ph type="body" sz="quarter" idx="20"/>
-          </p:nvPr>
-        </p:nvSpPr>
-        <p:spPr/>
-        <p:txBody>
-          <a:bodyPr/>
-          <a:lstStyle/>
-          <a:p>
-            <a:endParaRPr lang="en-AU"/>
-          </a:p>
-        </p:txBody>
-      </p:sp>
-      <p:sp>
-        <p:nvSpPr>
-          <p:cNvPr id="8" name="Text Placeholder 7">
-            <a:extLst>
-              <a:ext uri="{FF2B5EF4-FFF2-40B4-BE49-F238E27FC236}">
-                <a16:creationId xmlns:a16="http://schemas.microsoft.com/office/drawing/2014/main" id="{A2310DB3-AF7C-4385-AAF5-46B464AB22A5}"/>
-              </a:ext>
-            </a:extLst>
-          </p:cNvPr>
-          <p:cNvSpPr>
-            <a:spLocks noGrp="1"/>
-          </p:cNvSpPr>
-          <p:nvPr>
-            <p:ph type="body" sz="quarter" idx="17"/>
-          </p:nvPr>
-        </p:nvSpPr>
-        <p:spPr/>
-        <p:txBody>
-          <a:bodyPr/>
-          <a:lstStyle/>
-          <a:p>
-            <a:endParaRPr lang="en-AU"/>
-          </a:p>
-        </p:txBody>
-      </p:sp>
-      <p:sp>
-        <p:nvSpPr>
-          <p:cNvPr id="9" name="Text Placeholder 8">
-            <a:extLst>
-              <a:ext uri="{FF2B5EF4-FFF2-40B4-BE49-F238E27FC236}">
-                <a16:creationId xmlns:a16="http://schemas.microsoft.com/office/drawing/2014/main" id="{208DC6EC-6B72-4D9E-93C2-B2FDD869ACEE}"/>
-              </a:ext>
-            </a:extLst>
-          </p:cNvPr>
-          <p:cNvSpPr>
-            <a:spLocks noGrp="1"/>
-          </p:cNvSpPr>
-          <p:nvPr>
-            <p:ph type="body" sz="quarter" idx="23"/>
-          </p:nvPr>
-        </p:nvSpPr>
-        <p:spPr/>
-        <p:txBody>
-          <a:bodyPr/>
-          <a:lstStyle/>
-          <a:p>
-            <a:endParaRPr lang="en-AU" dirty="0"/>
-          </a:p>
-        </p:txBody>
-      </p:sp>
-      <p:sp>
-        <p:nvSpPr>
-          <p:cNvPr id="4" name="Chart Placeholder 3">
-            <a:extLst>
-              <a:ext uri="{FF2B5EF4-FFF2-40B4-BE49-F238E27FC236}">
-                <a16:creationId xmlns:a16="http://schemas.microsoft.com/office/drawing/2014/main" id="{9246017C-5549-44EB-843D-10D765CEA9A6}"/>
-              </a:ext>
-            </a:extLst>
-          </p:cNvPr>
-          <p:cNvSpPr>
-            <a:spLocks noGrp="1"/>
-          </p:cNvSpPr>
-          <p:nvPr>
-            <p:ph type="chart" sz="quarter" idx="18"/>
-          </p:nvPr>
-        </p:nvSpPr>
-        <p:spPr>
-          <a:xfrm>
-            <a:off x="1486959" y="1746907"/>
-            <a:ext cx="6673607" cy="4541111"/>
-          </a:xfrm>
-        </p:spPr>
-      </p:sp>
-    </p:spTree>
-    <p:extLst>
-      <p:ext uri="{BB962C8B-B14F-4D97-AF65-F5344CB8AC3E}">
-        <p14:creationId xmlns:p14="http://schemas.microsoft.com/office/powerpoint/2010/main" val="2803462885"/>
       </p:ext>
     </p:extLst>
   </p:cSld>
@@ -6465,46 +6213,7 @@
           <a:lstStyle/>
           <a:p>
             <a:r>
-              <a:t>20/02/2020</a:t>
-            </a:r>
-          </a:p>
-        </p:txBody>
-      </p:sp>
-    </p:spTree>
-  </p:cSld>
-  <p:clrMapOvr>
-    <a:masterClrMapping/>
-  </p:clrMapOvr>
-</p:sld>
-</file>
-
-<file path=ppt/slides/slide6.xml><?xml version="1.0" encoding="utf-8"?>
-<p:sld xmlns:a="http://schemas.openxmlformats.org/drawingml/2006/main" xmlns:p="http://schemas.openxmlformats.org/presentationml/2006/main" xmlns:r="http://schemas.openxmlformats.org/officeDocument/2006/relationships">
-  <p:cSld>
-    <p:spTree>
-      <p:nvGrpSpPr>
-        <p:cNvPr id="1" name=""/>
-        <p:cNvGrpSpPr/>
-        <p:nvPr/>
-      </p:nvGrpSpPr>
-      <p:grpSpPr/>
-      <p:sp>
-        <p:nvSpPr>
-          <p:cNvPr id="2" name="Title 1"/>
-          <p:cNvSpPr>
-            <a:spLocks noGrp="1"/>
-          </p:cNvSpPr>
-          <p:nvPr>
-            <p:ph type="ctrTitle"/>
-          </p:nvPr>
-        </p:nvSpPr>
-        <p:spPr/>
-        <p:txBody>
-          <a:bodyPr/>
-          <a:lstStyle/>
-          <a:p>
-            <a:r>
-              <a:t>This is the section</a:t>
+              <a:t>21/02/2020</a:t>
             </a:r>
           </a:p>
         </p:txBody>

</xml_diff>